<commit_message>
added session 1 complete.
</commit_message>
<xml_diff>
--- a/Session 1/Softdev Session 1 2016.pptx
+++ b/Session 1/Softdev Session 1 2016.pptx
@@ -20,10 +20,10 @@
     <p:sldId id="263" r:id="rId14"/>
     <p:sldId id="264" r:id="rId15"/>
     <p:sldId id="265" r:id="rId16"/>
-    <p:sldId id="278" r:id="rId17"/>
-    <p:sldId id="266" r:id="rId18"/>
-    <p:sldId id="267" r:id="rId19"/>
-    <p:sldId id="268" r:id="rId20"/>
+    <p:sldId id="287" r:id="rId17"/>
+    <p:sldId id="288" r:id="rId18"/>
+    <p:sldId id="289" r:id="rId19"/>
+    <p:sldId id="278" r:id="rId20"/>
     <p:sldId id="270" r:id="rId21"/>
     <p:sldId id="271" r:id="rId22"/>
     <p:sldId id="269" r:id="rId23"/>
@@ -6434,7 +6434,15 @@
             </a:r>
             <a:r>
               <a:rPr lang="en-ZA" dirty="0" smtClean="0"/>
-              <a:t>all the files within the repository except those specific not to be tracked.</a:t>
+              <a:t>all the files within the repository except </a:t>
+            </a:r>
+            <a:r>
+              <a:rPr lang="en-ZA" dirty="0" smtClean="0"/>
+              <a:t>specific files which have been marked </a:t>
+            </a:r>
+            <a:r>
+              <a:rPr lang="en-ZA" dirty="0" smtClean="0"/>
+              <a:t>not to be tracked.</a:t>
             </a:r>
             <a:endParaRPr lang="en-ZA" dirty="0"/>
           </a:p>
@@ -7250,22 +7258,19 @@
             <p:ph type="title"/>
           </p:nvPr>
         </p:nvSpPr>
-        <p:spPr/>
-        <p:txBody>
-          <a:bodyPr/>
-          <a:lstStyle/>
-          <a:p>
-            <a:r>
-              <a:rPr lang="en-US" dirty="0" smtClean="0"/>
-              <a:t>Common </a:t>
-            </a:r>
-            <a:r>
-              <a:rPr lang="en-US" dirty="0" err="1" smtClean="0"/>
-              <a:t>Git</a:t>
-            </a:r>
-            <a:r>
-              <a:rPr lang="en-US" dirty="0" smtClean="0"/>
-              <a:t> Workflow</a:t>
+        <p:spPr>
+          <a:xfrm>
+            <a:off x="646111" y="452718"/>
+            <a:ext cx="9404723" cy="1105626"/>
+          </a:xfrm>
+        </p:spPr>
+        <p:txBody>
+          <a:bodyPr/>
+          <a:lstStyle/>
+          <a:p>
+            <a:r>
+              <a:rPr lang="en-ZA" dirty="0" smtClean="0"/>
+              <a:t>Continuous Integration (CI)</a:t>
             </a:r>
             <a:endParaRPr lang="en-ZA" dirty="0"/>
           </a:p>
@@ -7281,27 +7286,68 @@
             <p:ph idx="1"/>
           </p:nvPr>
         </p:nvSpPr>
-        <p:spPr/>
-        <p:txBody>
-          <a:bodyPr/>
-          <a:lstStyle/>
-          <a:p>
-            <a:r>
-              <a:rPr lang="en-US" dirty="0" smtClean="0"/>
-              <a:t>Master Branch -&gt; CI -&gt; automated deployment</a:t>
-            </a:r>
-          </a:p>
-          <a:p>
-            <a:r>
-              <a:rPr lang="en-US" dirty="0" smtClean="0"/>
-              <a:t>Develop Branch -&gt; CI -&gt; QA deployment</a:t>
-            </a:r>
-          </a:p>
-          <a:p>
-            <a:r>
-              <a:rPr lang="en-US" dirty="0" smtClean="0"/>
-              <a:t>Sub branches &lt;- hotfixes and feature requests</a:t>
-            </a:r>
+        <p:spPr>
+          <a:xfrm>
+            <a:off x="1103312" y="1712890"/>
+            <a:ext cx="8946541" cy="4535509"/>
+          </a:xfrm>
+        </p:spPr>
+        <p:txBody>
+          <a:bodyPr/>
+          <a:lstStyle/>
+          <a:p>
+            <a:r>
+              <a:rPr lang="en-ZA" dirty="0"/>
+              <a:t>Similar concept to source control</a:t>
+            </a:r>
+          </a:p>
+          <a:p>
+            <a:r>
+              <a:rPr lang="en-ZA" dirty="0"/>
+              <a:t>Operates </a:t>
+            </a:r>
+            <a:r>
+              <a:rPr lang="en-ZA" dirty="0" smtClean="0"/>
+              <a:t>along-side </a:t>
+            </a:r>
+            <a:r>
+              <a:rPr lang="en-ZA" dirty="0"/>
+              <a:t>source control</a:t>
+            </a:r>
+          </a:p>
+          <a:p>
+            <a:r>
+              <a:rPr lang="en-ZA" dirty="0"/>
+              <a:t>It is a shared repository where the code is pushed periodically by the developer and an automated bot attempts to build the code. </a:t>
+            </a:r>
+          </a:p>
+          <a:p>
+            <a:pPr lvl="2"/>
+            <a:r>
+              <a:rPr lang="en-ZA" dirty="0"/>
+              <a:t>The bot may also just use the source control system and check for any new commits</a:t>
+            </a:r>
+          </a:p>
+          <a:p>
+            <a:r>
+              <a:rPr lang="en-ZA" dirty="0"/>
+              <a:t>Usually there will be some kind of interface where the result of the build is displayed</a:t>
+            </a:r>
+          </a:p>
+          <a:p>
+            <a:pPr lvl="2"/>
+            <a:r>
+              <a:rPr lang="en-ZA" dirty="0"/>
+              <a:t>Either pass or fail</a:t>
+            </a:r>
+          </a:p>
+          <a:p>
+            <a:r>
+              <a:rPr lang="en-ZA" dirty="0"/>
+              <a:t>Some CI systems can also automatically deploy the code to its “live” version</a:t>
+            </a:r>
+          </a:p>
+          <a:p>
             <a:endParaRPr lang="en-ZA" dirty="0"/>
           </a:p>
         </p:txBody>
@@ -7309,7 +7355,7 @@
     </p:spTree>
     <p:extLst>
       <p:ext uri="{BB962C8B-B14F-4D97-AF65-F5344CB8AC3E}">
-        <p14:creationId xmlns:p14="http://schemas.microsoft.com/office/powerpoint/2010/main" val="2263616210"/>
+        <p14:creationId xmlns:p14="http://schemas.microsoft.com/office/powerpoint/2010/main" val="3791697309"/>
       </p:ext>
     </p:extLst>
   </p:cSld>
@@ -7353,19 +7399,14 @@
             <p:ph type="title"/>
           </p:nvPr>
         </p:nvSpPr>
-        <p:spPr>
-          <a:xfrm>
-            <a:off x="646111" y="452718"/>
-            <a:ext cx="9404723" cy="1105626"/>
-          </a:xfrm>
-        </p:spPr>
+        <p:spPr/>
         <p:txBody>
           <a:bodyPr/>
           <a:lstStyle/>
           <a:p>
             <a:r>
               <a:rPr lang="en-ZA" dirty="0" smtClean="0"/>
-              <a:t>Continuous Integration (CI)</a:t>
+              <a:t>Why Use A CI</a:t>
             </a:r>
             <a:endParaRPr lang="en-ZA" dirty="0"/>
           </a:p>
@@ -7381,65 +7422,38 @@
             <p:ph idx="1"/>
           </p:nvPr>
         </p:nvSpPr>
-        <p:spPr>
-          <a:xfrm>
-            <a:off x="1103312" y="1712890"/>
-            <a:ext cx="8946541" cy="4535509"/>
-          </a:xfrm>
-        </p:spPr>
+        <p:spPr/>
         <p:txBody>
           <a:bodyPr/>
           <a:lstStyle/>
           <a:p>
             <a:r>
               <a:rPr lang="en-ZA" dirty="0"/>
-              <a:t>Similar concept to source control</a:t>
+              <a:t>Makes sure that the recent code changes are working so that if there is already a released version of the software this update does not break the software</a:t>
             </a:r>
           </a:p>
           <a:p>
             <a:r>
               <a:rPr lang="en-ZA" dirty="0"/>
-              <a:t>Operates </a:t>
-            </a:r>
-            <a:r>
-              <a:rPr lang="en-ZA" dirty="0" smtClean="0"/>
-              <a:t>along-side </a:t>
-            </a:r>
+              <a:t>Allows teams to see where some lower level errors may exist</a:t>
+            </a:r>
+          </a:p>
+          <a:p>
             <a:r>
               <a:rPr lang="en-ZA" dirty="0"/>
-              <a:t>source control</a:t>
+              <a:t>In team based projects it is important to see where the latest revision of the project is and if it is indeed working</a:t>
             </a:r>
           </a:p>
           <a:p>
             <a:r>
               <a:rPr lang="en-ZA" dirty="0"/>
-              <a:t>It is a shared repository where the code is pushed periodically by the developer and an automated bot attempts to build the code. </a:t>
-            </a:r>
-          </a:p>
-          <a:p>
-            <a:pPr lvl="2"/>
+              <a:t>Test-first development strategies</a:t>
+            </a:r>
+          </a:p>
+          <a:p>
             <a:r>
               <a:rPr lang="en-ZA" dirty="0"/>
-              <a:t>The bot may also just use the source control system and check for any new commits</a:t>
-            </a:r>
-          </a:p>
-          <a:p>
-            <a:r>
-              <a:rPr lang="en-ZA" dirty="0"/>
-              <a:t>Usually there will be some kind of interface where the result of the build is displayed</a:t>
-            </a:r>
-          </a:p>
-          <a:p>
-            <a:pPr lvl="2"/>
-            <a:r>
-              <a:rPr lang="en-ZA" dirty="0"/>
-              <a:t>Either pass or fail</a:t>
-            </a:r>
-          </a:p>
-          <a:p>
-            <a:r>
-              <a:rPr lang="en-ZA" dirty="0"/>
-              <a:t>Some CI systems can also automatically deploy the code to its “live” version</a:t>
+              <a:t>Centralised deployment mechanism</a:t>
             </a:r>
           </a:p>
           <a:p>
@@ -7450,7 +7464,7 @@
     </p:spTree>
     <p:extLst>
       <p:ext uri="{BB962C8B-B14F-4D97-AF65-F5344CB8AC3E}">
-        <p14:creationId xmlns:p14="http://schemas.microsoft.com/office/powerpoint/2010/main" val="331715293"/>
+        <p14:creationId xmlns:p14="http://schemas.microsoft.com/office/powerpoint/2010/main" val="3423617187"/>
       </p:ext>
     </p:extLst>
   </p:cSld>
@@ -7501,7 +7515,7 @@
           <a:p>
             <a:r>
               <a:rPr lang="en-ZA" dirty="0" smtClean="0"/>
-              <a:t>Why Use A CI</a:t>
+              <a:t>Examples of Online CI Services</a:t>
             </a:r>
             <a:endParaRPr lang="en-ZA" dirty="0"/>
           </a:p>
@@ -7523,35 +7537,42 @@
           <a:lstStyle/>
           <a:p>
             <a:r>
-              <a:rPr lang="en-ZA" dirty="0"/>
-              <a:t>Makes sure that the recent code changes are working so that if there is already a released version of the software this update does not break the software</a:t>
-            </a:r>
-          </a:p>
-          <a:p>
-            <a:r>
-              <a:rPr lang="en-ZA" dirty="0"/>
-              <a:t>Allows teams to see where some lower level errors may exist</a:t>
-            </a:r>
-          </a:p>
-          <a:p>
-            <a:r>
-              <a:rPr lang="en-ZA" dirty="0"/>
-              <a:t>In team based projects it is important to see where the latest revision of the project is and if it is indeed working</a:t>
-            </a:r>
-          </a:p>
-          <a:p>
-            <a:r>
-              <a:rPr lang="en-ZA" dirty="0"/>
-              <a:t>Test-first development strategies</a:t>
-            </a:r>
-          </a:p>
-          <a:p>
-            <a:r>
-              <a:rPr lang="en-ZA" dirty="0"/>
-              <a:t>Centralised deployment mechanism</a:t>
-            </a:r>
-          </a:p>
-          <a:p>
+              <a:rPr lang="en-ZA" dirty="0">
+                <a:hlinkClick r:id="rId2"/>
+              </a:rPr>
+              <a:t>https://travis-ci.org</a:t>
+            </a:r>
+            <a:r>
+              <a:rPr lang="en-ZA" dirty="0" smtClean="0">
+                <a:hlinkClick r:id="rId2"/>
+              </a:rPr>
+              <a:t>/</a:t>
+            </a:r>
+            <a:endParaRPr lang="en-ZA" dirty="0" smtClean="0"/>
+          </a:p>
+          <a:p>
+            <a:r>
+              <a:rPr lang="en-ZA" dirty="0">
+                <a:hlinkClick r:id="rId3"/>
+              </a:rPr>
+              <a:t>https://www.appveyor.com</a:t>
+            </a:r>
+            <a:r>
+              <a:rPr lang="en-ZA" dirty="0" smtClean="0">
+                <a:hlinkClick r:id="rId3"/>
+              </a:rPr>
+              <a:t>/</a:t>
+            </a:r>
+            <a:endParaRPr lang="en-ZA" dirty="0" smtClean="0"/>
+          </a:p>
+          <a:p>
+            <a:endParaRPr lang="en-ZA" dirty="0"/>
+          </a:p>
+          <a:p>
+            <a:r>
+              <a:rPr lang="en-ZA" dirty="0" smtClean="0"/>
+              <a:t>We will cover testing later</a:t>
+            </a:r>
             <a:endParaRPr lang="en-ZA" dirty="0"/>
           </a:p>
         </p:txBody>
@@ -7559,7 +7580,7 @@
     </p:spTree>
     <p:extLst>
       <p:ext uri="{BB962C8B-B14F-4D97-AF65-F5344CB8AC3E}">
-        <p14:creationId xmlns:p14="http://schemas.microsoft.com/office/powerpoint/2010/main" val="1357863678"/>
+        <p14:creationId xmlns:p14="http://schemas.microsoft.com/office/powerpoint/2010/main" val="857486570"/>
       </p:ext>
     </p:extLst>
   </p:cSld>
@@ -7609,8 +7630,16 @@
           <a:lstStyle/>
           <a:p>
             <a:r>
-              <a:rPr lang="en-ZA" dirty="0" smtClean="0"/>
-              <a:t>Examples of Online CI Services</a:t>
+              <a:rPr lang="en-US" dirty="0" smtClean="0"/>
+              <a:t>Common </a:t>
+            </a:r>
+            <a:r>
+              <a:rPr lang="en-US" dirty="0" err="1" smtClean="0"/>
+              <a:t>Git</a:t>
+            </a:r>
+            <a:r>
+              <a:rPr lang="en-US" dirty="0" smtClean="0"/>
+              <a:t> Workflow</a:t>
             </a:r>
             <a:endParaRPr lang="en-ZA" dirty="0"/>
           </a:p>
@@ -7632,41 +7661,20 @@
           <a:lstStyle/>
           <a:p>
             <a:r>
-              <a:rPr lang="en-ZA" dirty="0">
-                <a:hlinkClick r:id="rId2"/>
-              </a:rPr>
-              <a:t>https://travis-ci.org</a:t>
-            </a:r>
-            <a:r>
-              <a:rPr lang="en-ZA" dirty="0" smtClean="0">
-                <a:hlinkClick r:id="rId2"/>
-              </a:rPr>
-              <a:t>/</a:t>
-            </a:r>
-            <a:endParaRPr lang="en-ZA" dirty="0" smtClean="0"/>
-          </a:p>
-          <a:p>
-            <a:r>
-              <a:rPr lang="en-ZA" dirty="0">
-                <a:hlinkClick r:id="rId3"/>
-              </a:rPr>
-              <a:t>https://www.appveyor.com</a:t>
-            </a:r>
-            <a:r>
-              <a:rPr lang="en-ZA" dirty="0" smtClean="0">
-                <a:hlinkClick r:id="rId3"/>
-              </a:rPr>
-              <a:t>/</a:t>
-            </a:r>
-            <a:endParaRPr lang="en-ZA" dirty="0" smtClean="0"/>
-          </a:p>
-          <a:p>
-            <a:endParaRPr lang="en-ZA" dirty="0"/>
-          </a:p>
-          <a:p>
-            <a:r>
-              <a:rPr lang="en-ZA" dirty="0" smtClean="0"/>
-              <a:t>We will cover testing later</a:t>
+              <a:rPr lang="en-US" dirty="0" smtClean="0"/>
+              <a:t>Master Branch -&gt; CI -&gt; automated deployment</a:t>
+            </a:r>
+          </a:p>
+          <a:p>
+            <a:r>
+              <a:rPr lang="en-US" dirty="0" smtClean="0"/>
+              <a:t>Develop Branch -&gt; CI -&gt; QA deployment</a:t>
+            </a:r>
+          </a:p>
+          <a:p>
+            <a:r>
+              <a:rPr lang="en-US" dirty="0" smtClean="0"/>
+              <a:t>Sub branches &lt;- hotfixes and feature requests</a:t>
             </a:r>
             <a:endParaRPr lang="en-ZA" dirty="0"/>
           </a:p>
@@ -7675,7 +7683,7 @@
     </p:spTree>
     <p:extLst>
       <p:ext uri="{BB962C8B-B14F-4D97-AF65-F5344CB8AC3E}">
-        <p14:creationId xmlns:p14="http://schemas.microsoft.com/office/powerpoint/2010/main" val="913708809"/>
+        <p14:creationId xmlns:p14="http://schemas.microsoft.com/office/powerpoint/2010/main" val="2263616210"/>
       </p:ext>
     </p:extLst>
   </p:cSld>
@@ -8786,35 +8794,31 @@
           <a:p>
             <a:pPr marL="0" indent="0"/>
             <a:r>
-              <a:rPr lang="en-ZA" dirty="0"/>
-              <a:t>Or </a:t>
-            </a:r>
-            <a:r>
-              <a:rPr lang="en-ZA" dirty="0">
+              <a:rPr lang="en-ZA" dirty="0" smtClean="0"/>
+              <a:t>Email me at:</a:t>
+            </a:r>
+            <a:r>
+              <a:rPr lang="en-ZA" dirty="0" smtClean="0"/>
+              <a:t> </a:t>
+            </a:r>
+            <a:r>
+              <a:rPr lang="en-ZA" dirty="0" smtClean="0">
                 <a:hlinkClick r:id="rId5"/>
               </a:rPr>
               <a:t>contact@jasonchalom.com</a:t>
             </a:r>
-            <a:endParaRPr lang="en-ZA" dirty="0"/>
-          </a:p>
-          <a:p>
-            <a:pPr marL="0" indent="0"/>
-            <a:r>
-              <a:rPr lang="en-ZA" dirty="0"/>
-              <a:t>Preferably: </a:t>
-            </a:r>
-            <a:r>
-              <a:rPr lang="en-ZA" dirty="0" smtClean="0">
-                <a:hlinkClick r:id="rId6"/>
-              </a:rPr>
-              <a:t>softdev16@jasonchalom.com</a:t>
-            </a:r>
-            <a:endParaRPr lang="en-ZA" dirty="0"/>
-          </a:p>
-          <a:p>
-            <a:pPr marL="0" indent="0">
-              <a:buNone/>
-            </a:pPr>
+            <a:endParaRPr lang="en-ZA" dirty="0" smtClean="0"/>
+          </a:p>
+          <a:p>
+            <a:pPr marL="400050" lvl="1" indent="0"/>
+            <a:r>
+              <a:rPr lang="en-US" dirty="0" smtClean="0"/>
+              <a:t>Have the subject line: SoftDev2016 “what </a:t>
+            </a:r>
+            <a:r>
+              <a:rPr lang="en-US" smtClean="0"/>
+              <a:t>your subject is”</a:t>
+            </a:r>
             <a:endParaRPr lang="en-ZA" dirty="0"/>
           </a:p>
         </p:txBody>

</xml_diff>